<commit_message>
More fixes to PK.
</commit_message>
<xml_diff>
--- a/BerkeleyClass/CS290Spring2013/Lectures/Cryptoclass8.pptx
+++ b/BerkeleyClass/CS290Spring2013/Lectures/Cryptoclass8.pptx
@@ -9760,8 +9760,8 @@
           </a:p>
         </p:txBody>
       </p:sp>
-      <mc:AlternateContent xmlns:mc="http://schemas.openxmlformats.org/markup-compatibility/2006" xmlns:a14="http://schemas.microsoft.com/office/drawing/2010/main">
-        <mc:Choice Requires="a14">
+      <mc:AlternateContent xmlns:mc="http://schemas.openxmlformats.org/markup-compatibility/2006">
+        <mc:Choice xmlns:a14="http://schemas.microsoft.com/office/drawing/2010/main" Requires="a14">
           <p:sp>
             <p:nvSpPr>
               <p:cNvPr id="93189" name="Rectangle 3"/>
@@ -9787,7 +9787,7 @@
                     <m:sSup>
                       <m:sSupPr>
                         <m:ctrlPr>
-                          <a:rPr lang="en-US" sz="2000" i="1" smtClean="0">
+                          <a:rPr lang="en-US" sz="2400" i="1" smtClean="0">
                             <a:latin typeface="Cambria Math" panose="02040503050406030204" pitchFamily="18" charset="0"/>
                             <a:cs typeface="Calibri" panose="020F0502020204030204" pitchFamily="34" charset="0"/>
                           </a:rPr>
@@ -9795,7 +9795,7 @@
                       </m:sSupPr>
                       <m:e>
                         <m:r>
-                          <a:rPr lang="en-US" sz="2000" b="0" i="1" smtClean="0">
+                          <a:rPr lang="en-US" sz="2400" b="0" i="1" smtClean="0">
                             <a:latin typeface="Cambria Math" panose="02040503050406030204" pitchFamily="18" charset="0"/>
                             <a:cs typeface="Calibri" panose="020F0502020204030204" pitchFamily="34" charset="0"/>
                           </a:rPr>
@@ -9804,7 +9804,7 @@
                       </m:e>
                       <m:sup>
                         <m:r>
-                          <a:rPr lang="en-US" sz="2000" b="0" i="1" smtClean="0">
+                          <a:rPr lang="en-US" sz="2400" b="0" i="1" smtClean="0">
                             <a:latin typeface="Cambria Math" panose="02040503050406030204" pitchFamily="18" charset="0"/>
                             <a:cs typeface="Calibri" panose="020F0502020204030204" pitchFamily="34" charset="0"/>
                           </a:rPr>
@@ -9813,49 +9813,49 @@
                       </m:sup>
                     </m:sSup>
                     <m:r>
-                      <a:rPr lang="en-US" sz="2000" b="0" i="1" smtClean="0">
+                      <a:rPr lang="en-US" sz="2400" b="0" i="1" smtClean="0">
                         <a:latin typeface="Cambria Math" panose="02040503050406030204" pitchFamily="18" charset="0"/>
                         <a:cs typeface="Calibri" panose="020F0502020204030204" pitchFamily="34" charset="0"/>
                       </a:rPr>
                       <m:t>=</m:t>
                     </m:r>
                     <m:r>
-                      <a:rPr lang="en-US" sz="2000" b="0" i="1" smtClean="0">
+                      <a:rPr lang="en-US" sz="2400" b="0" i="1" smtClean="0">
                         <a:latin typeface="Cambria Math" panose="02040503050406030204" pitchFamily="18" charset="0"/>
                         <a:cs typeface="Calibri" panose="020F0502020204030204" pitchFamily="34" charset="0"/>
                       </a:rPr>
                       <m:t>𝑦</m:t>
                     </m:r>
                     <m:r>
-                      <a:rPr lang="en-US" sz="2000" b="0" i="1" smtClean="0">
+                      <a:rPr lang="en-US" sz="2400" b="0" i="1" smtClean="0">
                         <a:latin typeface="Cambria Math" panose="02040503050406030204" pitchFamily="18" charset="0"/>
                         <a:cs typeface="Calibri" panose="020F0502020204030204" pitchFamily="34" charset="0"/>
                       </a:rPr>
                       <m:t>(</m:t>
                     </m:r>
                     <m:r>
-                      <a:rPr lang="en-US" sz="2000" b="0" i="1" smtClean="0">
+                      <a:rPr lang="en-US" sz="2400" b="0" i="1" smtClean="0">
                         <a:latin typeface="Cambria Math" panose="02040503050406030204" pitchFamily="18" charset="0"/>
                         <a:cs typeface="Calibri" panose="020F0502020204030204" pitchFamily="34" charset="0"/>
                       </a:rPr>
                       <m:t>𝑚𝑜𝑑</m:t>
                     </m:r>
                     <m:r>
-                      <a:rPr lang="en-US" sz="2000" b="0" i="1" smtClean="0">
+                      <a:rPr lang="en-US" sz="2400" b="0" i="1" smtClean="0">
                         <a:latin typeface="Cambria Math" panose="02040503050406030204" pitchFamily="18" charset="0"/>
                         <a:cs typeface="Calibri" panose="020F0502020204030204" pitchFamily="34" charset="0"/>
                       </a:rPr>
                       <m:t> </m:t>
                     </m:r>
                     <m:r>
-                      <a:rPr lang="en-US" sz="2000" b="0" i="1" smtClean="0">
+                      <a:rPr lang="en-US" sz="2400" b="0" i="1" smtClean="0">
                         <a:latin typeface="Cambria Math" panose="02040503050406030204" pitchFamily="18" charset="0"/>
                         <a:cs typeface="Calibri" panose="020F0502020204030204" pitchFamily="34" charset="0"/>
                       </a:rPr>
                       <m:t>𝑝</m:t>
                     </m:r>
                     <m:r>
-                      <a:rPr lang="en-US" sz="2000" b="0" i="1" smtClean="0">
+                      <a:rPr lang="en-US" sz="2400" b="0" i="1" smtClean="0">
                         <a:latin typeface="Cambria Math" panose="02040503050406030204" pitchFamily="18" charset="0"/>
                         <a:cs typeface="Calibri" panose="020F0502020204030204" pitchFamily="34" charset="0"/>
                       </a:rPr>
@@ -9864,7 +9864,7 @@
                   </m:oMath>
                 </a14:m>
                 <a:r>
-                  <a:rPr lang="en-US" sz="2000" dirty="0">
+                  <a:rPr lang="en-US" sz="2400" dirty="0">
                     <a:latin typeface="Calibri" panose="020F0502020204030204" pitchFamily="34" charset="0"/>
                     <a:cs typeface="Calibri" panose="020F0502020204030204" pitchFamily="34" charset="0"/>
                   </a:rPr>
@@ -9875,14 +9875,14 @@
                 <a14:m>
                   <m:oMath xmlns:m="http://schemas.openxmlformats.org/officeDocument/2006/math">
                     <m:r>
-                      <a:rPr lang="en-US" sz="2000" b="0" i="1" smtClean="0">
+                      <a:rPr lang="en-US" sz="2400" b="0" i="1" smtClean="0">
                         <a:latin typeface="Cambria Math" panose="02040503050406030204" pitchFamily="18" charset="0"/>
                         <a:cs typeface="Calibri" panose="020F0502020204030204" pitchFamily="34" charset="0"/>
                       </a:rPr>
                       <m:t>𝑚</m:t>
                     </m:r>
                     <m:r>
-                      <a:rPr lang="en-US" sz="2000" b="0" i="1" smtClean="0">
+                      <a:rPr lang="en-US" sz="2400" b="0" i="1" smtClean="0">
                         <a:latin typeface="Cambria Math" panose="02040503050406030204" pitchFamily="18" charset="0"/>
                         <a:ea typeface="Cambria Math" panose="02040503050406030204" pitchFamily="18" charset="0"/>
                         <a:cs typeface="Calibri" panose="020F0502020204030204" pitchFamily="34" charset="0"/>
@@ -9893,7 +9893,7 @@
                       <m:radPr>
                         <m:degHide m:val="on"/>
                         <m:ctrlPr>
-                          <a:rPr lang="en-US" sz="2000" b="0" i="1" smtClean="0">
+                          <a:rPr lang="en-US" sz="2400" b="0" i="1" smtClean="0">
                             <a:latin typeface="Cambria Math" panose="02040503050406030204" pitchFamily="18" charset="0"/>
                             <a:ea typeface="Cambria Math" panose="02040503050406030204" pitchFamily="18" charset="0"/>
                             <a:cs typeface="Calibri" panose="020F0502020204030204" pitchFamily="34" charset="0"/>
@@ -9903,7 +9903,7 @@
                       <m:deg/>
                       <m:e>
                         <m:r>
-                          <a:rPr lang="en-US" sz="2000" b="0" i="1" smtClean="0">
+                          <a:rPr lang="en-US" sz="2400" b="0" i="1" smtClean="0">
                             <a:latin typeface="Cambria Math" panose="02040503050406030204" pitchFamily="18" charset="0"/>
                             <a:ea typeface="Cambria Math" panose="02040503050406030204" pitchFamily="18" charset="0"/>
                             <a:cs typeface="Calibri" panose="020F0502020204030204" pitchFamily="34" charset="0"/>
@@ -9915,7 +9915,7 @@
                   </m:oMath>
                 </a14:m>
                 <a:r>
-                  <a:rPr lang="en-US" sz="2000" dirty="0">
+                  <a:rPr lang="en-US" sz="2400" dirty="0">
                     <a:latin typeface="Calibri" panose="020F0502020204030204" pitchFamily="34" charset="0"/>
                     <a:cs typeface="Calibri" panose="020F0502020204030204" pitchFamily="34" charset="0"/>
                   </a:rPr>
@@ -9924,7 +9924,7 @@
               </a:p>
               <a:p>
                 <a:r>
-                  <a:rPr lang="en-US" sz="2000" dirty="0">
+                  <a:rPr lang="en-US" sz="2400" dirty="0">
                     <a:latin typeface="Calibri" panose="020F0502020204030204" pitchFamily="34" charset="0"/>
                     <a:cs typeface="Calibri" panose="020F0502020204030204" pitchFamily="34" charset="0"/>
                   </a:rPr>
@@ -9935,7 +9935,7 @@
                     <m:sSup>
                       <m:sSupPr>
                         <m:ctrlPr>
-                          <a:rPr lang="en-US" sz="2000" b="0" i="1" dirty="0" smtClean="0">
+                          <a:rPr lang="en-US" sz="2400" b="0" i="1" dirty="0" smtClean="0">
                             <a:latin typeface="Cambria Math" panose="02040503050406030204" pitchFamily="18" charset="0"/>
                             <a:cs typeface="Calibri" panose="020F0502020204030204" pitchFamily="34" charset="0"/>
                           </a:rPr>
@@ -9943,7 +9943,7 @@
                       </m:sSupPr>
                       <m:e>
                         <m:r>
-                          <a:rPr lang="en-US" sz="2000" b="0" i="1" dirty="0" smtClean="0">
+                          <a:rPr lang="en-US" sz="2400" b="0" i="1" dirty="0" smtClean="0">
                             <a:latin typeface="Cambria Math" panose="02040503050406030204" pitchFamily="18" charset="0"/>
                             <a:cs typeface="Calibri" panose="020F0502020204030204" pitchFamily="34" charset="0"/>
                           </a:rPr>
@@ -9952,7 +9952,7 @@
                       </m:e>
                       <m:sup>
                         <m:r>
-                          <a:rPr lang="en-US" sz="2000" b="0" i="1" dirty="0" smtClean="0">
+                          <a:rPr lang="en-US" sz="2400" b="0" i="1" dirty="0" smtClean="0">
                             <a:latin typeface="Cambria Math" panose="02040503050406030204" pitchFamily="18" charset="0"/>
                             <a:cs typeface="Calibri" panose="020F0502020204030204" pitchFamily="34" charset="0"/>
                           </a:rPr>
@@ -9961,28 +9961,28 @@
                       </m:sup>
                     </m:sSup>
                     <m:r>
-                      <a:rPr lang="en-US" sz="2000" b="0" i="1" dirty="0" smtClean="0">
+                      <a:rPr lang="en-US" sz="2400" b="0" i="1" dirty="0" smtClean="0">
                         <a:latin typeface="Cambria Math" panose="02040503050406030204" pitchFamily="18" charset="0"/>
                         <a:cs typeface="Calibri" panose="020F0502020204030204" pitchFamily="34" charset="0"/>
                       </a:rPr>
                       <m:t>,</m:t>
                     </m:r>
                     <m:r>
-                      <a:rPr lang="en-US" sz="2000" i="1" dirty="0" smtClean="0">
+                      <a:rPr lang="en-US" sz="2400" i="1" dirty="0" smtClean="0">
                         <a:latin typeface="Cambria Math" panose="02040503050406030204" pitchFamily="18" charset="0"/>
                         <a:cs typeface="Calibri" panose="020F0502020204030204" pitchFamily="34" charset="0"/>
                       </a:rPr>
                       <m:t> </m:t>
                     </m:r>
                     <m:r>
-                      <a:rPr lang="en-US" sz="2000" b="0" i="1" dirty="0" smtClean="0">
+                      <a:rPr lang="en-US" sz="2400" b="0" i="1" dirty="0" smtClean="0">
                         <a:latin typeface="Cambria Math" panose="02040503050406030204" pitchFamily="18" charset="0"/>
                         <a:cs typeface="Calibri" panose="020F0502020204030204" pitchFamily="34" charset="0"/>
                       </a:rPr>
                       <m:t>0</m:t>
                     </m:r>
                     <m:r>
-                      <a:rPr lang="en-US" sz="2000" b="0" i="1" dirty="0" smtClean="0">
+                      <a:rPr lang="en-US" sz="2400" b="0" i="1" dirty="0" smtClean="0">
                         <a:latin typeface="Cambria Math" panose="02040503050406030204" pitchFamily="18" charset="0"/>
                         <a:ea typeface="Cambria Math" panose="02040503050406030204" pitchFamily="18" charset="0"/>
                         <a:cs typeface="Calibri" panose="020F0502020204030204" pitchFamily="34" charset="0"/>
@@ -9990,7 +9990,7 @@
                       <m:t>≤</m:t>
                     </m:r>
                     <m:r>
-                      <a:rPr lang="en-US" sz="2000" b="0" i="1" dirty="0" smtClean="0">
+                      <a:rPr lang="en-US" sz="2400" b="0" i="1" dirty="0" smtClean="0">
                         <a:latin typeface="Cambria Math" panose="02040503050406030204" pitchFamily="18" charset="0"/>
                         <a:ea typeface="Cambria Math" panose="02040503050406030204" pitchFamily="18" charset="0"/>
                         <a:cs typeface="Calibri" panose="020F0502020204030204" pitchFamily="34" charset="0"/>
@@ -9998,7 +9998,7 @@
                       <m:t>𝑗</m:t>
                     </m:r>
                     <m:r>
-                      <a:rPr lang="en-US" sz="2000" b="0" i="1" dirty="0" smtClean="0">
+                      <a:rPr lang="en-US" sz="2400" b="0" i="1" dirty="0" smtClean="0">
                         <a:latin typeface="Cambria Math" panose="02040503050406030204" pitchFamily="18" charset="0"/>
                         <a:ea typeface="Cambria Math" panose="02040503050406030204" pitchFamily="18" charset="0"/>
                         <a:cs typeface="Calibri" panose="020F0502020204030204" pitchFamily="34" charset="0"/>
@@ -10006,7 +10006,7 @@
                       <m:t>&lt;</m:t>
                     </m:r>
                     <m:r>
-                      <a:rPr lang="en-US" sz="2000" b="0" i="1" dirty="0" smtClean="0">
+                      <a:rPr lang="en-US" sz="2400" b="0" i="1" dirty="0" smtClean="0">
                         <a:latin typeface="Cambria Math" panose="02040503050406030204" pitchFamily="18" charset="0"/>
                         <a:ea typeface="Cambria Math" panose="02040503050406030204" pitchFamily="18" charset="0"/>
                         <a:cs typeface="Calibri" panose="020F0502020204030204" pitchFamily="34" charset="0"/>
@@ -10016,7 +10016,7 @@
                   </m:oMath>
                 </a14:m>
                 <a:r>
-                  <a:rPr lang="en-US" sz="2000" dirty="0">
+                  <a:rPr lang="en-US" sz="2400" dirty="0">
                     <a:latin typeface="Calibri" panose="020F0502020204030204" pitchFamily="34" charset="0"/>
                     <a:cs typeface="Calibri" panose="020F0502020204030204" pitchFamily="34" charset="0"/>
                   </a:rPr>
@@ -10025,7 +10025,7 @@
               </a:p>
               <a:p>
                 <a:r>
-                  <a:rPr lang="en-US" sz="2000" dirty="0">
+                  <a:rPr lang="en-US" sz="2400" dirty="0">
                     <a:latin typeface="Calibri" panose="020F0502020204030204" pitchFamily="34" charset="0"/>
                     <a:cs typeface="Calibri" panose="020F0502020204030204" pitchFamily="34" charset="0"/>
                   </a:rPr>
@@ -10034,21 +10034,21 @@
                 <a14:m>
                   <m:oMath xmlns:m="http://schemas.openxmlformats.org/officeDocument/2006/math">
                     <m:r>
-                      <a:rPr lang="en-US" sz="2000" b="0" i="1" dirty="0" smtClean="0">
+                      <a:rPr lang="en-US" sz="2400" b="0" i="1" dirty="0" smtClean="0">
                         <a:latin typeface="Cambria Math" panose="02040503050406030204" pitchFamily="18" charset="0"/>
                         <a:cs typeface="Calibri" panose="020F0502020204030204" pitchFamily="34" charset="0"/>
                       </a:rPr>
                       <m:t>(</m:t>
                     </m:r>
                     <m:r>
-                      <a:rPr lang="en-US" sz="2000" b="0" i="1" dirty="0" err="1" smtClean="0">
+                      <a:rPr lang="en-US" sz="2400" b="0" i="1" dirty="0" err="1" smtClean="0">
                         <a:latin typeface="Cambria Math" panose="02040503050406030204" pitchFamily="18" charset="0"/>
                         <a:cs typeface="Calibri" panose="020F0502020204030204" pitchFamily="34" charset="0"/>
                       </a:rPr>
                       <m:t>𝑗</m:t>
                     </m:r>
                     <m:r>
-                      <a:rPr lang="en-US" sz="2000" b="0" i="1" dirty="0" err="1" smtClean="0">
+                      <a:rPr lang="en-US" sz="2400" b="0" i="1" dirty="0" err="1" smtClean="0">
                         <a:latin typeface="Cambria Math" panose="02040503050406030204" pitchFamily="18" charset="0"/>
                         <a:cs typeface="Calibri" panose="020F0502020204030204" pitchFamily="34" charset="0"/>
                       </a:rPr>
@@ -10057,7 +10057,7 @@
                     <m:sSup>
                       <m:sSupPr>
                         <m:ctrlPr>
-                          <a:rPr lang="en-US" sz="2000" i="1" dirty="0">
+                          <a:rPr lang="en-US" sz="2400" i="1" dirty="0">
                             <a:latin typeface="Cambria Math" panose="02040503050406030204" pitchFamily="18" charset="0"/>
                             <a:cs typeface="Calibri" panose="020F0502020204030204" pitchFamily="34" charset="0"/>
                           </a:rPr>
@@ -10065,7 +10065,7 @@
                       </m:sSupPr>
                       <m:e>
                         <m:r>
-                          <a:rPr lang="en-US" sz="2000" i="1" dirty="0">
+                          <a:rPr lang="en-US" sz="2400" i="1" dirty="0">
                             <a:latin typeface="Cambria Math" panose="02040503050406030204" pitchFamily="18" charset="0"/>
                             <a:cs typeface="Calibri" panose="020F0502020204030204" pitchFamily="34" charset="0"/>
                           </a:rPr>
@@ -10074,7 +10074,7 @@
                       </m:e>
                       <m:sup>
                         <m:r>
-                          <a:rPr lang="en-US" sz="2000" i="1" dirty="0">
+                          <a:rPr lang="en-US" sz="2400" i="1" dirty="0">
                             <a:latin typeface="Cambria Math" panose="02040503050406030204" pitchFamily="18" charset="0"/>
                             <a:cs typeface="Calibri" panose="020F0502020204030204" pitchFamily="34" charset="0"/>
                           </a:rPr>
@@ -10083,14 +10083,14 @@
                       </m:sup>
                     </m:sSup>
                     <m:r>
-                      <a:rPr lang="en-US" sz="2000" b="0" i="1" dirty="0" smtClean="0">
+                      <a:rPr lang="en-US" sz="2400" b="0" i="1" dirty="0" smtClean="0">
                         <a:latin typeface="Cambria Math" panose="02040503050406030204" pitchFamily="18" charset="0"/>
                         <a:cs typeface="Calibri" panose="020F0502020204030204" pitchFamily="34" charset="0"/>
                       </a:rPr>
                       <m:t>)</m:t>
                     </m:r>
                     <m:r>
-                      <a:rPr lang="en-US" sz="2000" i="1" dirty="0">
+                      <a:rPr lang="en-US" sz="2400" i="1" dirty="0">
                         <a:latin typeface="Cambria Math" panose="02040503050406030204" pitchFamily="18" charset="0"/>
                         <a:cs typeface="Calibri" panose="020F0502020204030204" pitchFamily="34" charset="0"/>
                       </a:rPr>
@@ -10099,7 +10099,7 @@
                   </m:oMath>
                 </a14:m>
                 <a:r>
-                  <a:rPr lang="en-US" sz="2000" dirty="0">
+                  <a:rPr lang="en-US" sz="2400" dirty="0">
                     <a:latin typeface="Calibri" panose="020F0502020204030204" pitchFamily="34" charset="0"/>
                     <a:cs typeface="Calibri" panose="020F0502020204030204" pitchFamily="34" charset="0"/>
                   </a:rPr>
@@ -10108,7 +10108,7 @@
               </a:p>
               <a:p>
                 <a:r>
-                  <a:rPr lang="en-US" sz="2000" dirty="0">
+                  <a:rPr lang="en-US" sz="2400" dirty="0">
                     <a:latin typeface="Calibri" panose="020F0502020204030204" pitchFamily="34" charset="0"/>
                     <a:cs typeface="Calibri" panose="020F0502020204030204" pitchFamily="34" charset="0"/>
                   </a:rPr>
@@ -10117,21 +10117,21 @@
                 <a14:m>
                   <m:oMath xmlns:m="http://schemas.openxmlformats.org/officeDocument/2006/math">
                     <m:r>
-                      <a:rPr lang="en-US" sz="2000" i="1" dirty="0" smtClean="0">
+                      <a:rPr lang="en-US" sz="2400" i="1" dirty="0" smtClean="0">
                         <a:latin typeface="Cambria Math" panose="02040503050406030204" pitchFamily="18" charset="0"/>
                         <a:cs typeface="Calibri" panose="020F0502020204030204" pitchFamily="34" charset="0"/>
                       </a:rPr>
                       <m:t> </m:t>
                     </m:r>
                     <m:r>
-                      <a:rPr lang="en-US" sz="2000" i="1" dirty="0" err="1">
+                      <a:rPr lang="en-US" sz="2400" i="1" dirty="0" err="1">
                         <a:latin typeface="Cambria Math" panose="02040503050406030204" pitchFamily="18" charset="0"/>
                         <a:cs typeface="Calibri" panose="020F0502020204030204" pitchFamily="34" charset="0"/>
                       </a:rPr>
                       <m:t>𝑖</m:t>
                     </m:r>
                     <m:r>
-                      <a:rPr lang="en-US" sz="2000" i="1" dirty="0">
+                      <a:rPr lang="en-US" sz="2400" i="1" dirty="0">
                         <a:latin typeface="Cambria Math" panose="02040503050406030204" pitchFamily="18" charset="0"/>
                         <a:cs typeface="Calibri" panose="020F0502020204030204" pitchFamily="34" charset="0"/>
                       </a:rPr>
@@ -10140,7 +10140,7 @@
                   </m:oMath>
                 </a14:m>
                 <a:r>
-                  <a:rPr lang="en-US" sz="2000" dirty="0">
+                  <a:rPr lang="en-US" sz="2400" dirty="0">
                     <a:latin typeface="Calibri" panose="020F0502020204030204" pitchFamily="34" charset="0"/>
                     <a:cs typeface="Calibri" panose="020F0502020204030204" pitchFamily="34" charset="0"/>
                   </a:rPr>
@@ -10149,7 +10149,7 @@
                 <a14:m>
                   <m:oMath xmlns:m="http://schemas.openxmlformats.org/officeDocument/2006/math">
                     <m:r>
-                      <a:rPr lang="en-US" sz="2000" b="0" i="1" dirty="0" smtClean="0">
+                      <a:rPr lang="en-US" sz="2400" b="0" i="1" dirty="0" smtClean="0">
                         <a:latin typeface="Cambria Math" panose="02040503050406030204" pitchFamily="18" charset="0"/>
                         <a:cs typeface="Calibri" panose="020F0502020204030204" pitchFamily="34" charset="0"/>
                       </a:rPr>
@@ -10158,7 +10158,7 @@
                     <m:sSup>
                       <m:sSupPr>
                         <m:ctrlPr>
-                          <a:rPr lang="en-US" sz="2000" b="0" i="1" dirty="0" smtClean="0">
+                          <a:rPr lang="en-US" sz="2400" b="0" i="1" dirty="0" smtClean="0">
                             <a:latin typeface="Cambria Math" panose="02040503050406030204" pitchFamily="18" charset="0"/>
                             <a:cs typeface="Calibri" panose="020F0502020204030204" pitchFamily="34" charset="0"/>
                           </a:rPr>
@@ -10166,7 +10166,7 @@
                       </m:sSupPr>
                       <m:e>
                         <m:r>
-                          <a:rPr lang="en-US" sz="2000" b="0" i="1" dirty="0" smtClean="0">
+                          <a:rPr lang="en-US" sz="2400" b="0" i="1" dirty="0" smtClean="0">
                             <a:latin typeface="Cambria Math" panose="02040503050406030204" pitchFamily="18" charset="0"/>
                             <a:cs typeface="Calibri" panose="020F0502020204030204" pitchFamily="34" charset="0"/>
                           </a:rPr>
@@ -10175,14 +10175,14 @@
                       </m:e>
                       <m:sup>
                         <m:r>
-                          <a:rPr lang="en-US" sz="2000" b="0" i="1" dirty="0" smtClean="0">
+                          <a:rPr lang="en-US" sz="2400" b="0" i="1" dirty="0" smtClean="0">
                             <a:latin typeface="Cambria Math" panose="02040503050406030204" pitchFamily="18" charset="0"/>
                             <a:cs typeface="Calibri" panose="020F0502020204030204" pitchFamily="34" charset="0"/>
                           </a:rPr>
                           <m:t>−</m:t>
                         </m:r>
                         <m:r>
-                          <a:rPr lang="en-US" sz="2000" b="0" i="1" dirty="0" smtClean="0">
+                          <a:rPr lang="en-US" sz="2400" b="0" i="1" dirty="0" smtClean="0">
                             <a:latin typeface="Cambria Math" panose="02040503050406030204" pitchFamily="18" charset="0"/>
                             <a:cs typeface="Calibri" panose="020F0502020204030204" pitchFamily="34" charset="0"/>
                           </a:rPr>
@@ -10191,35 +10191,35 @@
                       </m:sup>
                     </m:sSup>
                     <m:r>
-                      <a:rPr lang="en-US" sz="2000" b="0" i="1" dirty="0" smtClean="0">
+                      <a:rPr lang="en-US" sz="2400" b="0" i="1" dirty="0" smtClean="0">
                         <a:latin typeface="Cambria Math" panose="02040503050406030204" pitchFamily="18" charset="0"/>
                         <a:cs typeface="Calibri" panose="020F0502020204030204" pitchFamily="34" charset="0"/>
                       </a:rPr>
                       <m:t>(</m:t>
                     </m:r>
                     <m:r>
-                      <a:rPr lang="en-US" sz="2000" b="0" i="1" dirty="0" smtClean="0">
+                      <a:rPr lang="en-US" sz="2400" b="0" i="1" dirty="0" smtClean="0">
                         <a:latin typeface="Cambria Math" panose="02040503050406030204" pitchFamily="18" charset="0"/>
                         <a:cs typeface="Calibri" panose="020F0502020204030204" pitchFamily="34" charset="0"/>
                       </a:rPr>
                       <m:t>𝑚𝑜𝑑</m:t>
                     </m:r>
                     <m:r>
-                      <a:rPr lang="en-US" sz="2000" b="0" i="1" dirty="0" smtClean="0">
+                      <a:rPr lang="en-US" sz="2400" b="0" i="1" dirty="0" smtClean="0">
                         <a:latin typeface="Cambria Math" panose="02040503050406030204" pitchFamily="18" charset="0"/>
                         <a:cs typeface="Calibri" panose="020F0502020204030204" pitchFamily="34" charset="0"/>
                       </a:rPr>
                       <m:t> </m:t>
                     </m:r>
                     <m:r>
-                      <a:rPr lang="en-US" sz="2000" b="0" i="1" dirty="0" smtClean="0">
+                      <a:rPr lang="en-US" sz="2400" b="0" i="1" dirty="0" smtClean="0">
                         <a:latin typeface="Cambria Math" panose="02040503050406030204" pitchFamily="18" charset="0"/>
                         <a:cs typeface="Calibri" panose="020F0502020204030204" pitchFamily="34" charset="0"/>
                       </a:rPr>
                       <m:t>𝑝</m:t>
                     </m:r>
                     <m:r>
-                      <a:rPr lang="en-US" sz="2000" b="0" i="1" dirty="0" smtClean="0">
+                      <a:rPr lang="en-US" sz="2400" b="0" i="1" dirty="0" smtClean="0">
                         <a:latin typeface="Cambria Math" panose="02040503050406030204" pitchFamily="18" charset="0"/>
                         <a:cs typeface="Calibri" panose="020F0502020204030204" pitchFamily="34" charset="0"/>
                       </a:rPr>
@@ -10228,7 +10228,7 @@
                   </m:oMath>
                 </a14:m>
                 <a:r>
-                  <a:rPr lang="en-US" sz="2000" dirty="0">
+                  <a:rPr lang="en-US" sz="2400" dirty="0">
                     <a:latin typeface="Calibri" panose="020F0502020204030204" pitchFamily="34" charset="0"/>
                     <a:cs typeface="Calibri" panose="020F0502020204030204" pitchFamily="34" charset="0"/>
                   </a:rPr>
@@ -10237,7 +10237,7 @@
               </a:p>
               <a:p>
                 <a:r>
-                  <a:rPr lang="en-US" sz="2000" dirty="0">
+                  <a:rPr lang="en-US" sz="2400" dirty="0">
                     <a:latin typeface="Calibri" panose="020F0502020204030204" pitchFamily="34" charset="0"/>
                     <a:cs typeface="Calibri" panose="020F0502020204030204" pitchFamily="34" charset="0"/>
                   </a:rPr>
@@ -10246,7 +10246,7 @@
                 <a14:m>
                   <m:oMath xmlns:m="http://schemas.openxmlformats.org/officeDocument/2006/math">
                     <m:r>
-                      <a:rPr lang="en-US" sz="2000" b="0" i="1" smtClean="0">
+                      <a:rPr lang="en-US" sz="2400" b="0" i="1" smtClean="0">
                         <a:latin typeface="Cambria Math" panose="02040503050406030204" pitchFamily="18" charset="0"/>
                         <a:cs typeface="Calibri" panose="020F0502020204030204" pitchFamily="34" charset="0"/>
                       </a:rPr>
@@ -10255,7 +10255,7 @@
                     <m:sSup>
                       <m:sSupPr>
                         <m:ctrlPr>
-                          <a:rPr lang="en-US" sz="2000" b="0" i="1" smtClean="0">
+                          <a:rPr lang="en-US" sz="2400" b="0" i="1" smtClean="0">
                             <a:latin typeface="Cambria Math" panose="02040503050406030204" pitchFamily="18" charset="0"/>
                             <a:cs typeface="Calibri" panose="020F0502020204030204" pitchFamily="34" charset="0"/>
                           </a:rPr>
@@ -10263,7 +10263,7 @@
                       </m:sSupPr>
                       <m:e>
                         <m:r>
-                          <a:rPr lang="en-US" sz="2000" b="0" i="1" smtClean="0">
+                          <a:rPr lang="en-US" sz="2400" b="0" i="1" smtClean="0">
                             <a:latin typeface="Cambria Math" panose="02040503050406030204" pitchFamily="18" charset="0"/>
                             <a:cs typeface="Calibri" panose="020F0502020204030204" pitchFamily="34" charset="0"/>
                           </a:rPr>
@@ -10272,14 +10272,14 @@
                       </m:e>
                       <m:sup>
                         <m:r>
-                          <a:rPr lang="en-US" sz="2000" b="0" i="1" smtClean="0">
+                          <a:rPr lang="en-US" sz="2400" b="0" i="1" smtClean="0">
                             <a:latin typeface="Cambria Math" panose="02040503050406030204" pitchFamily="18" charset="0"/>
                             <a:cs typeface="Calibri" panose="020F0502020204030204" pitchFamily="34" charset="0"/>
                           </a:rPr>
                           <m:t>−</m:t>
                         </m:r>
                         <m:r>
-                          <a:rPr lang="en-US" sz="2000" b="0" i="1" smtClean="0">
+                          <a:rPr lang="en-US" sz="2400" b="0" i="1" smtClean="0">
                             <a:latin typeface="Cambria Math" panose="02040503050406030204" pitchFamily="18" charset="0"/>
                             <a:cs typeface="Calibri" panose="020F0502020204030204" pitchFamily="34" charset="0"/>
                           </a:rPr>
@@ -10288,7 +10288,7 @@
                       </m:sup>
                     </m:sSup>
                     <m:r>
-                      <a:rPr lang="en-US" sz="2000" b="0" i="1" smtClean="0">
+                      <a:rPr lang="en-US" sz="2400" b="0" i="1" smtClean="0">
                         <a:latin typeface="Cambria Math" panose="02040503050406030204" pitchFamily="18" charset="0"/>
                         <a:cs typeface="Calibri" panose="020F0502020204030204" pitchFamily="34" charset="0"/>
                       </a:rPr>
@@ -10297,7 +10297,7 @@
                     <m:sSup>
                       <m:sSupPr>
                         <m:ctrlPr>
-                          <a:rPr lang="en-US" sz="2000" b="0" i="1" smtClean="0">
+                          <a:rPr lang="en-US" sz="2400" b="0" i="1" smtClean="0">
                             <a:latin typeface="Cambria Math" panose="02040503050406030204" pitchFamily="18" charset="0"/>
                             <a:cs typeface="Calibri" panose="020F0502020204030204" pitchFamily="34" charset="0"/>
                           </a:rPr>
@@ -10305,7 +10305,7 @@
                       </m:sSupPr>
                       <m:e>
                         <m:r>
-                          <a:rPr lang="en-US" sz="2000" b="0" i="1" smtClean="0">
+                          <a:rPr lang="en-US" sz="2400" b="0" i="1" smtClean="0">
                             <a:latin typeface="Cambria Math" panose="02040503050406030204" pitchFamily="18" charset="0"/>
                             <a:cs typeface="Calibri" panose="020F0502020204030204" pitchFamily="34" charset="0"/>
                           </a:rPr>
@@ -10314,7 +10314,7 @@
                       </m:e>
                       <m:sup>
                         <m:r>
-                          <a:rPr lang="en-US" sz="2000" b="0" i="1" smtClean="0">
+                          <a:rPr lang="en-US" sz="2400" b="0" i="1" smtClean="0">
                             <a:latin typeface="Cambria Math" panose="02040503050406030204" pitchFamily="18" charset="0"/>
                             <a:cs typeface="Calibri" panose="020F0502020204030204" pitchFamily="34" charset="0"/>
                           </a:rPr>
@@ -10323,35 +10323,35 @@
                       </m:sup>
                     </m:sSup>
                     <m:r>
-                      <a:rPr lang="en-US" sz="2000" b="0" i="1" smtClean="0">
+                      <a:rPr lang="en-US" sz="2400" b="0" i="1" smtClean="0">
                         <a:latin typeface="Cambria Math" panose="02040503050406030204" pitchFamily="18" charset="0"/>
                         <a:cs typeface="Calibri" panose="020F0502020204030204" pitchFamily="34" charset="0"/>
                       </a:rPr>
                       <m:t>(</m:t>
                     </m:r>
                     <m:r>
-                      <a:rPr lang="en-US" sz="2000" b="0" i="1" smtClean="0">
+                      <a:rPr lang="en-US" sz="2400" b="0" i="1" smtClean="0">
                         <a:latin typeface="Cambria Math" panose="02040503050406030204" pitchFamily="18" charset="0"/>
                         <a:cs typeface="Calibri" panose="020F0502020204030204" pitchFamily="34" charset="0"/>
                       </a:rPr>
                       <m:t>𝑚𝑜𝑑</m:t>
                     </m:r>
                     <m:r>
-                      <a:rPr lang="en-US" sz="2000" b="0" i="1" smtClean="0">
+                      <a:rPr lang="en-US" sz="2400" b="0" i="1" smtClean="0">
                         <a:latin typeface="Cambria Math" panose="02040503050406030204" pitchFamily="18" charset="0"/>
                         <a:cs typeface="Calibri" panose="020F0502020204030204" pitchFamily="34" charset="0"/>
                       </a:rPr>
                       <m:t> </m:t>
                     </m:r>
                     <m:r>
-                      <a:rPr lang="en-US" sz="2000" b="0" i="1" smtClean="0">
+                      <a:rPr lang="en-US" sz="2400" b="0" i="1" smtClean="0">
                         <a:latin typeface="Cambria Math" panose="02040503050406030204" pitchFamily="18" charset="0"/>
                         <a:cs typeface="Calibri" panose="020F0502020204030204" pitchFamily="34" charset="0"/>
                       </a:rPr>
                       <m:t>𝑝</m:t>
                     </m:r>
                     <m:r>
-                      <a:rPr lang="en-US" sz="2000" b="0" i="1" smtClean="0">
+                      <a:rPr lang="en-US" sz="2400" b="0" i="1" smtClean="0">
                         <a:latin typeface="Cambria Math" panose="02040503050406030204" pitchFamily="18" charset="0"/>
                         <a:cs typeface="Calibri" panose="020F0502020204030204" pitchFamily="34" charset="0"/>
                       </a:rPr>
@@ -10360,7 +10360,7 @@
                   </m:oMath>
                 </a14:m>
                 <a:r>
-                  <a:rPr lang="en-US" sz="2000" dirty="0">
+                  <a:rPr lang="en-US" sz="2400" dirty="0">
                     <a:latin typeface="Calibri" panose="020F0502020204030204" pitchFamily="34" charset="0"/>
                     <a:cs typeface="Calibri" panose="020F0502020204030204" pitchFamily="34" charset="0"/>
                   </a:rPr>
@@ -10371,42 +10371,42 @@
                 <a14:m>
                   <m:oMath xmlns:m="http://schemas.openxmlformats.org/officeDocument/2006/math">
                     <m:r>
-                      <a:rPr lang="en-US" sz="2000" i="1" dirty="0" smtClean="0">
+                      <a:rPr lang="en-US" sz="2400" i="1" dirty="0" smtClean="0">
                         <a:latin typeface="Cambria Math" panose="02040503050406030204" pitchFamily="18" charset="0"/>
                         <a:cs typeface="Calibri" panose="020F0502020204030204" pitchFamily="34" charset="0"/>
                       </a:rPr>
                       <m:t>𝑥</m:t>
                     </m:r>
                     <m:r>
-                      <a:rPr lang="en-US" sz="2000" i="1" dirty="0">
+                      <a:rPr lang="en-US" sz="2400" i="1" dirty="0">
                         <a:latin typeface="Cambria Math" panose="02040503050406030204" pitchFamily="18" charset="0"/>
                         <a:cs typeface="Calibri" panose="020F0502020204030204" pitchFamily="34" charset="0"/>
                       </a:rPr>
                       <m:t>= </m:t>
                     </m:r>
                     <m:r>
-                      <a:rPr lang="en-US" sz="2000" i="1" dirty="0" err="1">
+                      <a:rPr lang="en-US" sz="2400" i="1" dirty="0" err="1">
                         <a:latin typeface="Cambria Math" panose="02040503050406030204" pitchFamily="18" charset="0"/>
                         <a:cs typeface="Calibri" panose="020F0502020204030204" pitchFamily="34" charset="0"/>
                       </a:rPr>
                       <m:t>𝑚𝑗</m:t>
                     </m:r>
                     <m:r>
-                      <a:rPr lang="en-US" sz="2000" i="1" dirty="0" err="1">
+                      <a:rPr lang="en-US" sz="2400" i="1" dirty="0" err="1">
                         <a:latin typeface="Cambria Math" panose="02040503050406030204" pitchFamily="18" charset="0"/>
                         <a:cs typeface="Calibri" panose="020F0502020204030204" pitchFamily="34" charset="0"/>
                       </a:rPr>
                       <m:t>+</m:t>
                     </m:r>
                     <m:r>
-                      <a:rPr lang="en-US" sz="2000" i="1" dirty="0" err="1">
+                      <a:rPr lang="en-US" sz="2400" i="1" dirty="0" err="1">
                         <a:latin typeface="Cambria Math" panose="02040503050406030204" pitchFamily="18" charset="0"/>
                         <a:cs typeface="Calibri" panose="020F0502020204030204" pitchFamily="34" charset="0"/>
                       </a:rPr>
                       <m:t>𝑖</m:t>
                     </m:r>
                     <m:r>
-                      <a:rPr lang="en-US" sz="2000" i="1" dirty="0">
+                      <a:rPr lang="en-US" sz="2400" i="1" dirty="0">
                         <a:latin typeface="Cambria Math" panose="02040503050406030204" pitchFamily="18" charset="0"/>
                         <a:cs typeface="Calibri" panose="020F0502020204030204" pitchFamily="34" charset="0"/>
                       </a:rPr>
@@ -10415,7 +10415,7 @@
                   </m:oMath>
                 </a14:m>
                 <a:r>
-                  <a:rPr lang="en-US" sz="2000" dirty="0">
+                  <a:rPr lang="en-US" sz="2400" dirty="0">
                     <a:latin typeface="Calibri" panose="020F0502020204030204" pitchFamily="34" charset="0"/>
                     <a:cs typeface="Calibri" panose="020F0502020204030204" pitchFamily="34" charset="0"/>
                   </a:rPr>
@@ -10425,7 +10425,7 @@
             </p:txBody>
           </p:sp>
         </mc:Choice>
-        <mc:Fallback xmlns="">
+        <mc:Fallback>
           <p:sp>
             <p:nvSpPr>
               <p:cNvPr id="93189" name="Rectangle 3"/>
@@ -10444,7 +10444,7 @@
               <a:blipFill>
                 <a:blip r:embed="rId2"/>
                 <a:stretch>
-                  <a:fillRect l="-817" t="-1060"/>
+                  <a:fillRect l="-1307" t="-1060"/>
                 </a:stretch>
               </a:blipFill>
             </p:spPr>
@@ -21329,8 +21329,8 @@
           </a:p>
         </p:txBody>
       </p:sp>
-      <mc:AlternateContent xmlns:mc="http://schemas.openxmlformats.org/markup-compatibility/2006">
-        <mc:Choice xmlns:a14="http://schemas.microsoft.com/office/drawing/2010/main" Requires="a14">
+      <mc:AlternateContent xmlns:mc="http://schemas.openxmlformats.org/markup-compatibility/2006" xmlns:a14="http://schemas.microsoft.com/office/drawing/2010/main">
+        <mc:Choice Requires="a14">
           <p:sp>
             <p:nvSpPr>
               <p:cNvPr id="84997" name="Rectangle 3"/>
@@ -21837,7 +21837,7 @@
             </p:txBody>
           </p:sp>
         </mc:Choice>
-        <mc:Fallback>
+        <mc:Fallback xmlns="">
           <p:sp>
             <p:nvSpPr>
               <p:cNvPr id="84997" name="Rectangle 3"/>
@@ -30855,7 +30855,7 @@
         </p:nvSpPr>
         <p:spPr>
           <a:xfrm>
-            <a:off x="457200" y="1828800"/>
+            <a:off x="370608" y="2397991"/>
             <a:ext cx="7239000" cy="762000"/>
           </a:xfrm>
         </p:spPr>
@@ -30897,10 +30897,16 @@
           <p:cNvGraphicFramePr>
             <a:graphicFrameLocks noGrp="1"/>
           </p:cNvGraphicFramePr>
-          <p:nvPr/>
+          <p:nvPr>
+            <p:extLst>
+              <p:ext uri="{D42A27DB-BD31-4B8C-83A1-F6EECF244321}">
+                <p14:modId xmlns:p14="http://schemas.microsoft.com/office/powerpoint/2010/main" val="2333135922"/>
+              </p:ext>
+            </p:extLst>
+          </p:nvPr>
         </p:nvGraphicFramePr>
         <p:xfrm>
-          <a:off x="4419600" y="1143000"/>
+          <a:off x="4419600" y="1859280"/>
           <a:ext cx="2514596" cy="2595880"/>
         </p:xfrm>
         <a:graphic>
@@ -31901,10 +31907,16 @@
           <p:cNvGraphicFramePr>
             <a:graphicFrameLocks noGrp="1"/>
           </p:cNvGraphicFramePr>
-          <p:nvPr/>
+          <p:nvPr>
+            <p:extLst>
+              <p:ext uri="{D42A27DB-BD31-4B8C-83A1-F6EECF244321}">
+                <p14:modId xmlns:p14="http://schemas.microsoft.com/office/powerpoint/2010/main" val="2419224970"/>
+              </p:ext>
+            </p:extLst>
+          </p:nvPr>
         </p:nvGraphicFramePr>
         <p:xfrm>
-          <a:off x="7315199" y="1188722"/>
+          <a:off x="7315199" y="1905002"/>
           <a:ext cx="533400" cy="2560320"/>
         </p:xfrm>
         <a:graphic>
@@ -32140,10 +32152,16 @@
           <p:cNvGraphicFramePr>
             <a:graphicFrameLocks noGrp="1"/>
           </p:cNvGraphicFramePr>
-          <p:nvPr/>
+          <p:nvPr>
+            <p:extLst>
+              <p:ext uri="{D42A27DB-BD31-4B8C-83A1-F6EECF244321}">
+                <p14:modId xmlns:p14="http://schemas.microsoft.com/office/powerpoint/2010/main" val="2112697781"/>
+              </p:ext>
+            </p:extLst>
+          </p:nvPr>
         </p:nvGraphicFramePr>
         <p:xfrm>
-          <a:off x="8381999" y="1219200"/>
+          <a:off x="8381999" y="1935480"/>
           <a:ext cx="533400" cy="2560320"/>
         </p:xfrm>
         <a:graphic>
@@ -32389,7 +32407,7 @@
         </p:nvSpPr>
         <p:spPr>
           <a:xfrm>
-            <a:off x="7848599" y="2209800"/>
+            <a:off x="7848599" y="2926080"/>
             <a:ext cx="369012" cy="615553"/>
           </a:xfrm>
           <a:prstGeom prst="rect">
@@ -32428,7 +32446,7 @@
         </p:nvSpPr>
         <p:spPr>
           <a:xfrm>
-            <a:off x="457200" y="4004608"/>
+            <a:off x="533400" y="4738217"/>
             <a:ext cx="6172200" cy="1631216"/>
           </a:xfrm>
           <a:prstGeom prst="rect">
@@ -32726,8 +32744,8 @@
           </a:p>
         </p:txBody>
       </p:sp>
-      <mc:AlternateContent xmlns:mc="http://schemas.openxmlformats.org/markup-compatibility/2006">
-        <mc:Choice xmlns:a14="http://schemas.microsoft.com/office/drawing/2010/main" Requires="a14">
+      <mc:AlternateContent xmlns:mc="http://schemas.openxmlformats.org/markup-compatibility/2006" xmlns:a14="http://schemas.microsoft.com/office/drawing/2010/main">
+        <mc:Choice Requires="a14">
           <p:sp>
             <p:nvSpPr>
               <p:cNvPr id="1030" name="Rectangle 3"/>
@@ -33800,7 +33818,7 @@
             </p:txBody>
           </p:sp>
         </mc:Choice>
-        <mc:Fallback>
+        <mc:Fallback xmlns="">
           <p:sp>
             <p:nvSpPr>
               <p:cNvPr id="1030" name="Rectangle 3"/>

</xml_diff>